<commit_message>
small touches to the report
</commit_message>
<xml_diff>
--- a/task_2/solution.pptx
+++ b/task_2/solution.pptx
@@ -7801,7 +7801,7 @@
         <p:spPr>
           <a:xfrm>
             <a:off x="1399448" y="8161308"/>
-            <a:ext cx="1964897" cy="307905"/>
+            <a:ext cx="2340577" cy="307905"/>
           </a:xfrm>
           <a:prstGeom prst="rect">
             <a:avLst/>
@@ -7816,7 +7816,7 @@
           <a:p>
             <a:r>
               <a:rPr lang="en-US" sz="1401" dirty="0"/>
-              <a:t>no multiple alignments</a:t>
+              <a:t>no multiple best alignments</a:t>
             </a:r>
           </a:p>
         </p:txBody>
@@ -11440,7 +11440,7 @@
         <p:spPr>
           <a:xfrm>
             <a:off x="1399448" y="8173500"/>
-            <a:ext cx="2051331" cy="307905"/>
+            <a:ext cx="1745734" cy="307905"/>
           </a:xfrm>
           <a:prstGeom prst="rect">
             <a:avLst/>
@@ -11455,7 +11455,7 @@
           <a:p>
             <a:r>
               <a:rPr lang="en-US" sz="1401" dirty="0"/>
-              <a:t>two multiple alignments</a:t>
+              <a:t>two best alignments</a:t>
             </a:r>
           </a:p>
         </p:txBody>
@@ -11576,7 +11576,7 @@
               <a:rPr lang="en-US" sz="1801" dirty="0">
                 <a:solidFill>
                   <a:schemeClr val="bg1">
-                    <a:lumMod val="75000"/>
+                    <a:lumMod val="85000"/>
                   </a:schemeClr>
                 </a:solidFill>
               </a:rPr>
@@ -11590,7 +11590,7 @@
               <a:rPr lang="en-US" sz="1801" dirty="0">
                 <a:solidFill>
                   <a:schemeClr val="bg1">
-                    <a:lumMod val="75000"/>
+                    <a:lumMod val="85000"/>
                   </a:schemeClr>
                 </a:solidFill>
               </a:rPr>
@@ -11635,7 +11635,7 @@
               <a:rPr lang="en-US" sz="1801" dirty="0">
                 <a:solidFill>
                   <a:schemeClr val="bg1">
-                    <a:lumMod val="75000"/>
+                    <a:lumMod val="85000"/>
                   </a:schemeClr>
                 </a:solidFill>
               </a:rPr>
@@ -11676,7 +11676,7 @@
               <a:rPr lang="en-US" sz="1801" dirty="0">
                 <a:solidFill>
                   <a:schemeClr val="bg1">
-                    <a:lumMod val="65000"/>
+                    <a:lumMod val="85000"/>
                   </a:schemeClr>
                 </a:solidFill>
               </a:rPr>
@@ -11690,7 +11690,7 @@
               <a:rPr lang="en-US" sz="1801" dirty="0">
                 <a:solidFill>
                   <a:schemeClr val="bg1">
-                    <a:lumMod val="65000"/>
+                    <a:lumMod val="85000"/>
                   </a:schemeClr>
                 </a:solidFill>
               </a:rPr>
@@ -11731,7 +11731,7 @@
               <a:rPr lang="en-US" sz="1801" dirty="0">
                 <a:solidFill>
                   <a:schemeClr val="bg1">
-                    <a:lumMod val="65000"/>
+                    <a:lumMod val="85000"/>
                   </a:schemeClr>
                 </a:solidFill>
               </a:rPr>
@@ -11745,7 +11745,7 @@
               <a:rPr lang="en-US" sz="1801" dirty="0">
                 <a:solidFill>
                   <a:schemeClr val="bg1">
-                    <a:lumMod val="65000"/>
+                    <a:lumMod val="85000"/>
                   </a:schemeClr>
                 </a:solidFill>
               </a:rPr>

</xml_diff>

<commit_message>
add a note explaining the issues regarding part 3d
</commit_message>
<xml_diff>
--- a/task_2/solution.pptx
+++ b/task_2/solution.pptx
@@ -245,7 +245,7 @@
           <a:p>
             <a:fld id="{1CC8C958-8192-427F-98B1-6F9E189A1787}" type="datetimeFigureOut">
               <a:rPr lang="en-US" smtClean="0"/>
-              <a:t>3/18/2024</a:t>
+              <a:t>3/19/2024</a:t>
             </a:fld>
             <a:endParaRPr lang="en-US"/>
           </a:p>
@@ -415,7 +415,7 @@
           <a:p>
             <a:fld id="{1CC8C958-8192-427F-98B1-6F9E189A1787}" type="datetimeFigureOut">
               <a:rPr lang="en-US" smtClean="0"/>
-              <a:t>3/18/2024</a:t>
+              <a:t>3/19/2024</a:t>
             </a:fld>
             <a:endParaRPr lang="en-US"/>
           </a:p>
@@ -595,7 +595,7 @@
           <a:p>
             <a:fld id="{1CC8C958-8192-427F-98B1-6F9E189A1787}" type="datetimeFigureOut">
               <a:rPr lang="en-US" smtClean="0"/>
-              <a:t>3/18/2024</a:t>
+              <a:t>3/19/2024</a:t>
             </a:fld>
             <a:endParaRPr lang="en-US"/>
           </a:p>
@@ -765,7 +765,7 @@
           <a:p>
             <a:fld id="{1CC8C958-8192-427F-98B1-6F9E189A1787}" type="datetimeFigureOut">
               <a:rPr lang="en-US" smtClean="0"/>
-              <a:t>3/18/2024</a:t>
+              <a:t>3/19/2024</a:t>
             </a:fld>
             <a:endParaRPr lang="en-US"/>
           </a:p>
@@ -1011,7 +1011,7 @@
           <a:p>
             <a:fld id="{1CC8C958-8192-427F-98B1-6F9E189A1787}" type="datetimeFigureOut">
               <a:rPr lang="en-US" smtClean="0"/>
-              <a:t>3/18/2024</a:t>
+              <a:t>3/19/2024</a:t>
             </a:fld>
             <a:endParaRPr lang="en-US"/>
           </a:p>
@@ -1243,7 +1243,7 @@
           <a:p>
             <a:fld id="{1CC8C958-8192-427F-98B1-6F9E189A1787}" type="datetimeFigureOut">
               <a:rPr lang="en-US" smtClean="0"/>
-              <a:t>3/18/2024</a:t>
+              <a:t>3/19/2024</a:t>
             </a:fld>
             <a:endParaRPr lang="en-US"/>
           </a:p>
@@ -1610,7 +1610,7 @@
           <a:p>
             <a:fld id="{1CC8C958-8192-427F-98B1-6F9E189A1787}" type="datetimeFigureOut">
               <a:rPr lang="en-US" smtClean="0"/>
-              <a:t>3/18/2024</a:t>
+              <a:t>3/19/2024</a:t>
             </a:fld>
             <a:endParaRPr lang="en-US"/>
           </a:p>
@@ -1728,7 +1728,7 @@
           <a:p>
             <a:fld id="{1CC8C958-8192-427F-98B1-6F9E189A1787}" type="datetimeFigureOut">
               <a:rPr lang="en-US" smtClean="0"/>
-              <a:t>3/18/2024</a:t>
+              <a:t>3/19/2024</a:t>
             </a:fld>
             <a:endParaRPr lang="en-US"/>
           </a:p>
@@ -1823,7 +1823,7 @@
           <a:p>
             <a:fld id="{1CC8C958-8192-427F-98B1-6F9E189A1787}" type="datetimeFigureOut">
               <a:rPr lang="en-US" smtClean="0"/>
-              <a:t>3/18/2024</a:t>
+              <a:t>3/19/2024</a:t>
             </a:fld>
             <a:endParaRPr lang="en-US"/>
           </a:p>
@@ -2100,7 +2100,7 @@
           <a:p>
             <a:fld id="{1CC8C958-8192-427F-98B1-6F9E189A1787}" type="datetimeFigureOut">
               <a:rPr lang="en-US" smtClean="0"/>
-              <a:t>3/18/2024</a:t>
+              <a:t>3/19/2024</a:t>
             </a:fld>
             <a:endParaRPr lang="en-US"/>
           </a:p>
@@ -2357,7 +2357,7 @@
           <a:p>
             <a:fld id="{1CC8C958-8192-427F-98B1-6F9E189A1787}" type="datetimeFigureOut">
               <a:rPr lang="en-US" smtClean="0"/>
-              <a:t>3/18/2024</a:t>
+              <a:t>3/19/2024</a:t>
             </a:fld>
             <a:endParaRPr lang="en-US"/>
           </a:p>
@@ -2570,7 +2570,7 @@
           <a:p>
             <a:fld id="{1CC8C958-8192-427F-98B1-6F9E189A1787}" type="datetimeFigureOut">
               <a:rPr lang="en-US" smtClean="0"/>
-              <a:t>3/18/2024</a:t>
+              <a:t>3/19/2024</a:t>
             </a:fld>
             <a:endParaRPr lang="en-US"/>
           </a:p>
@@ -11798,8 +11798,8 @@
         </p:nvSpPr>
         <p:spPr>
           <a:xfrm>
-            <a:off x="670560" y="560832"/>
-            <a:ext cx="4060727" cy="8279190"/>
+            <a:off x="670560" y="335975"/>
+            <a:ext cx="5234940" cy="8279190"/>
           </a:xfrm>
           <a:prstGeom prst="rect">
             <a:avLst/>
@@ -11809,7 +11809,7 @@
           </a:solidFill>
         </p:spPr>
         <p:txBody>
-          <a:bodyPr wrap="none" rtlCol="0">
+          <a:bodyPr wrap="square" rtlCol="0">
             <a:spAutoFit/>
           </a:bodyPr>
           <a:lstStyle/>
@@ -18167,6 +18167,54 @@
           </a:p>
           <a:p>
             <a:endParaRPr lang="en-US" sz="700" dirty="0"/>
+          </a:p>
+        </p:txBody>
+      </p:sp>
+      <p:sp>
+        <p:nvSpPr>
+          <p:cNvPr id="2" name="BlokTextu 1">
+            <a:extLst>
+              <a:ext uri="{FF2B5EF4-FFF2-40B4-BE49-F238E27FC236}">
+                <a16:creationId xmlns:a16="http://schemas.microsoft.com/office/drawing/2014/main" id="{82223B63-BF19-CDCF-BBA9-F07ADBED1593}"/>
+              </a:ext>
+            </a:extLst>
+          </p:cNvPr>
+          <p:cNvSpPr txBox="1"/>
+          <p:nvPr/>
+        </p:nvSpPr>
+        <p:spPr>
+          <a:xfrm>
+            <a:off x="670560" y="8728710"/>
+            <a:ext cx="5234940" cy="707886"/>
+          </a:xfrm>
+          <a:prstGeom prst="rect">
+            <a:avLst/>
+          </a:prstGeom>
+          <a:noFill/>
+        </p:spPr>
+        <p:txBody>
+          <a:bodyPr wrap="square" rtlCol="0">
+            <a:spAutoFit/>
+          </a:bodyPr>
+          <a:lstStyle/>
+          <a:p>
+            <a:pPr algn="just"/>
+            <a:r>
+              <a:rPr lang="en-US" sz="800" b="1" i="1" dirty="0"/>
+              <a:t>Note: </a:t>
+            </a:r>
+            <a:r>
+              <a:rPr lang="en-US" sz="800" i="1" dirty="0"/>
+              <a:t>To solve part 3.d), I slightly altered the functions from the lab, so that the possibility of multiple optimal alignments is considered. That resulted in a changed signature of the ‘</a:t>
+            </a:r>
+            <a:r>
+              <a:rPr lang="en-US" sz="800" i="1" dirty="0" err="1"/>
+              <a:t>recover_align</a:t>
+            </a:r>
+            <a:r>
+              <a:rPr lang="en-US" sz="800" i="1" dirty="0"/>
+              <a:t>’ functions, where instead of one optimal alignment they now return a list of optimal alignments. I also made some naming changes regarding some of the functions. I hope this is not an issue for the grading of the assignment, otherwise I would be happy to provide my altered code.</a:t>
+            </a:r>
           </a:p>
         </p:txBody>
       </p:sp>

</xml_diff>